<commit_message>
Update TetraPlex deck 0.54 - dark mode.pptx
superapp
</commit_message>
<xml_diff>
--- a/Documentation/TetraPlex deck 0.54 - dark mode.pptx
+++ b/Documentation/TetraPlex deck 0.54 - dark mode.pptx
@@ -19,7 +19,8 @@
     <p:sldId id="275" r:id="rId13"/>
     <p:sldId id="272" r:id="rId14"/>
     <p:sldId id="274" r:id="rId15"/>
-    <p:sldId id="270" r:id="rId16"/>
+    <p:sldId id="276" r:id="rId16"/>
+    <p:sldId id="270" r:id="rId17"/>
   </p:sldIdLst>
   <p:sldSz cx="12192000" cy="6858000"/>
   <p:notesSz cx="6858000" cy="9144000"/>
@@ -120,7 +121,7 @@
   </p:defaultTextStyle>
   <p:extLst>
     <p:ext uri="{EFAFB233-063F-42B5-8137-9DF3F51BA10A}">
-      <p15:sldGuideLst xmlns="" xmlns:p15="http://schemas.microsoft.com/office/powerpoint/2012/main"/>
+      <p15:sldGuideLst xmlns:p15="http://schemas.microsoft.com/office/powerpoint/2012/main" xmlns=""/>
     </p:ext>
   </p:extLst>
 </p:presentation>
@@ -646,7 +647,7 @@
             <a:fld id="{D703D9E9-6871-4375-AC09-0A65C85665EF}" type="datetimeFigureOut">
               <a:rPr lang="de-DE" smtClean="0"/>
               <a:pPr/>
-              <a:t>11.08.2023</a:t>
+              <a:t>18.08.2023</a:t>
             </a:fld>
             <a:endParaRPr lang="de-DE"/>
           </a:p>
@@ -839,7 +840,7 @@
             <a:fld id="{D703D9E9-6871-4375-AC09-0A65C85665EF}" type="datetimeFigureOut">
               <a:rPr lang="de-DE" smtClean="0"/>
               <a:pPr/>
-              <a:t>11.08.2023</a:t>
+              <a:t>18.08.2023</a:t>
             </a:fld>
             <a:endParaRPr lang="de-DE"/>
           </a:p>
@@ -1021,7 +1022,7 @@
             <a:fld id="{D703D9E9-6871-4375-AC09-0A65C85665EF}" type="datetimeFigureOut">
               <a:rPr lang="de-DE" smtClean="0"/>
               <a:pPr/>
-              <a:t>11.08.2023</a:t>
+              <a:t>18.08.2023</a:t>
             </a:fld>
             <a:endParaRPr lang="de-DE"/>
           </a:p>
@@ -1286,7 +1287,7 @@
             <a:fld id="{D703D9E9-6871-4375-AC09-0A65C85665EF}" type="datetimeFigureOut">
               <a:rPr lang="de-DE" smtClean="0"/>
               <a:pPr/>
-              <a:t>11.08.2023</a:t>
+              <a:t>18.08.2023</a:t>
             </a:fld>
             <a:endParaRPr lang="de-DE"/>
           </a:p>
@@ -1699,7 +1700,7 @@
             <a:fld id="{D703D9E9-6871-4375-AC09-0A65C85665EF}" type="datetimeFigureOut">
               <a:rPr lang="de-DE" smtClean="0"/>
               <a:pPr/>
-              <a:t>11.08.2023</a:t>
+              <a:t>18.08.2023</a:t>
             </a:fld>
             <a:endParaRPr lang="de-DE"/>
           </a:p>
@@ -1943,7 +1944,7 @@
             <a:fld id="{D703D9E9-6871-4375-AC09-0A65C85665EF}" type="datetimeFigureOut">
               <a:rPr lang="de-DE" smtClean="0"/>
               <a:pPr/>
-              <a:t>11.08.2023</a:t>
+              <a:t>18.08.2023</a:t>
             </a:fld>
             <a:endParaRPr lang="de-DE"/>
           </a:p>
@@ -2181,7 +2182,7 @@
             <a:fld id="{D703D9E9-6871-4375-AC09-0A65C85665EF}" type="datetimeFigureOut">
               <a:rPr lang="de-DE" smtClean="0"/>
               <a:pPr/>
-              <a:t>11.08.2023</a:t>
+              <a:t>18.08.2023</a:t>
             </a:fld>
             <a:endParaRPr lang="de-DE"/>
           </a:p>
@@ -2378,7 +2379,7 @@
             <a:fld id="{D703D9E9-6871-4375-AC09-0A65C85665EF}" type="datetimeFigureOut">
               <a:rPr lang="de-DE" smtClean="0"/>
               <a:pPr/>
-              <a:t>11.08.2023</a:t>
+              <a:t>18.08.2023</a:t>
             </a:fld>
             <a:endParaRPr lang="de-DE"/>
           </a:p>
@@ -2478,7 +2479,7 @@
             <a:fld id="{D703D9E9-6871-4375-AC09-0A65C85665EF}" type="datetimeFigureOut">
               <a:rPr lang="de-DE" smtClean="0"/>
               <a:pPr/>
-              <a:t>11.08.2023</a:t>
+              <a:t>18.08.2023</a:t>
             </a:fld>
             <a:endParaRPr lang="de-DE"/>
           </a:p>
@@ -2616,7 +2617,7 @@
             <a:fld id="{D703D9E9-6871-4375-AC09-0A65C85665EF}" type="datetimeFigureOut">
               <a:rPr lang="de-DE" smtClean="0"/>
               <a:pPr/>
-              <a:t>11.08.2023</a:t>
+              <a:t>18.08.2023</a:t>
             </a:fld>
             <a:endParaRPr lang="de-DE"/>
           </a:p>
@@ -3131,7 +3132,7 @@
             <a:fld id="{D703D9E9-6871-4375-AC09-0A65C85665EF}" type="datetimeFigureOut">
               <a:rPr lang="de-DE" smtClean="0"/>
               <a:pPr/>
-              <a:t>11.08.2023</a:t>
+              <a:t>18.08.2023</a:t>
             </a:fld>
             <a:endParaRPr lang="de-DE"/>
           </a:p>
@@ -3394,7 +3395,7 @@
             <a:fld id="{D703D9E9-6871-4375-AC09-0A65C85665EF}" type="datetimeFigureOut">
               <a:rPr lang="de-DE" smtClean="0"/>
               <a:pPr/>
-              <a:t>11.08.2023</a:t>
+              <a:t>18.08.2023</a:t>
             </a:fld>
             <a:endParaRPr lang="de-DE"/>
           </a:p>
@@ -3939,7 +3940,7 @@
           <p:cNvPr id="3" name="Untertitel 2">
             <a:extLst>
               <a:ext uri="{FF2B5EF4-FFF2-40B4-BE49-F238E27FC236}">
-                <a16:creationId xmlns="" xmlns:a16="http://schemas.microsoft.com/office/drawing/2014/main" id="{66EAC223-604A-E53F-EADB-5FCF3F050425}"/>
+                <a16:creationId xmlns:a16="http://schemas.microsoft.com/office/drawing/2014/main" xmlns="" id="{66EAC223-604A-E53F-EADB-5FCF3F050425}"/>
               </a:ext>
             </a:extLst>
           </p:cNvPr>
@@ -4119,7 +4120,7 @@
     </p:spTree>
     <p:extLst>
       <p:ext uri="{BB962C8B-B14F-4D97-AF65-F5344CB8AC3E}">
-        <p14:creationId xmlns="" xmlns:p14="http://schemas.microsoft.com/office/powerpoint/2010/main" val="77256135"/>
+        <p14:creationId xmlns:p14="http://schemas.microsoft.com/office/powerpoint/2010/main" xmlns="" val="77256135"/>
       </p:ext>
     </p:extLst>
   </p:cSld>
@@ -4158,7 +4159,7 @@
           <p:cNvPr id="2" name="Titel 1">
             <a:extLst>
               <a:ext uri="{FF2B5EF4-FFF2-40B4-BE49-F238E27FC236}">
-                <a16:creationId xmlns="" xmlns:a16="http://schemas.microsoft.com/office/drawing/2014/main" id="{0E0F567F-A26B-3FB3-CCB2-26650C9159FD}"/>
+                <a16:creationId xmlns:a16="http://schemas.microsoft.com/office/drawing/2014/main" xmlns="" id="{0E0F567F-A26B-3FB3-CCB2-26650C9159FD}"/>
               </a:ext>
             </a:extLst>
           </p:cNvPr>
@@ -4202,7 +4203,7 @@
           <p:cNvPr id="3" name="Inhaltsplatzhalter 2">
             <a:extLst>
               <a:ext uri="{FF2B5EF4-FFF2-40B4-BE49-F238E27FC236}">
-                <a16:creationId xmlns="" xmlns:a16="http://schemas.microsoft.com/office/drawing/2014/main" id="{0C8E27EB-6D5D-FD5C-62B8-EF46AD9E1128}"/>
+                <a16:creationId xmlns:a16="http://schemas.microsoft.com/office/drawing/2014/main" xmlns="" id="{0C8E27EB-6D5D-FD5C-62B8-EF46AD9E1128}"/>
               </a:ext>
             </a:extLst>
           </p:cNvPr>
@@ -4331,7 +4332,7 @@
     </p:spTree>
     <p:extLst>
       <p:ext uri="{BB962C8B-B14F-4D97-AF65-F5344CB8AC3E}">
-        <p14:creationId xmlns="" xmlns:p14="http://schemas.microsoft.com/office/powerpoint/2010/main" val="3625188337"/>
+        <p14:creationId xmlns:p14="http://schemas.microsoft.com/office/powerpoint/2010/main" xmlns="" val="3625188337"/>
       </p:ext>
     </p:extLst>
   </p:cSld>
@@ -4732,9 +4733,6 @@
               </a:rPr>
               <a:t>Author</a:t>
             </a:r>
-            <a:endParaRPr lang="en-US" sz="2000" b="1" dirty="0" smtClean="0">
-              <a:latin typeface="Arial Narrow" pitchFamily="34" charset="0"/>
-            </a:endParaRPr>
           </a:p>
           <a:p>
             <a:endParaRPr lang="en-US" sz="3200" dirty="0">
@@ -4998,7 +4996,7 @@
           <p:cNvPr id="6" name="Inhaltsplatzhalter 2">
             <a:extLst>
               <a:ext uri="{FF2B5EF4-FFF2-40B4-BE49-F238E27FC236}">
-                <a16:creationId xmlns="" xmlns:a16="http://schemas.microsoft.com/office/drawing/2014/main" id="{0C8E27EB-6D5D-FD5C-62B8-EF46AD9E1128}"/>
+                <a16:creationId xmlns:a16="http://schemas.microsoft.com/office/drawing/2014/main" xmlns="" id="{0C8E27EB-6D5D-FD5C-62B8-EF46AD9E1128}"/>
               </a:ext>
             </a:extLst>
           </p:cNvPr>
@@ -5212,6 +5210,197 @@
 </file>
 
 <file path=ppt/slides/slide15.xml><?xml version="1.0" encoding="utf-8"?>
+<p:sld xmlns:a="http://schemas.openxmlformats.org/drawingml/2006/main" xmlns:r="http://schemas.openxmlformats.org/officeDocument/2006/relationships" xmlns:p="http://schemas.openxmlformats.org/presentationml/2006/main">
+  <p:cSld>
+    <p:spTree>
+      <p:nvGrpSpPr>
+        <p:cNvPr id="1" name=""/>
+        <p:cNvGrpSpPr/>
+        <p:nvPr/>
+      </p:nvGrpSpPr>
+      <p:grpSpPr>
+        <a:xfrm>
+          <a:off x="0" y="0"/>
+          <a:ext cx="0" cy="0"/>
+          <a:chOff x="0" y="0"/>
+          <a:chExt cx="0" cy="0"/>
+        </a:xfrm>
+      </p:grpSpPr>
+      <p:sp>
+        <p:nvSpPr>
+          <p:cNvPr id="2" name="Title 1"/>
+          <p:cNvSpPr>
+            <a:spLocks noGrp="1"/>
+          </p:cNvSpPr>
+          <p:nvPr>
+            <p:ph type="title"/>
+          </p:nvPr>
+        </p:nvSpPr>
+        <p:spPr/>
+        <p:txBody>
+          <a:bodyPr/>
+          <a:lstStyle/>
+          <a:p>
+            <a:r>
+              <a:rPr lang="de-DE" b="1" dirty="0" smtClean="0">
+                <a:solidFill>
+                  <a:srgbClr val="FFFF00"/>
+                </a:solidFill>
+              </a:rPr>
+              <a:t>Tetraplex as a future superapp</a:t>
+            </a:r>
+            <a:endParaRPr lang="en-US" dirty="0"/>
+          </a:p>
+        </p:txBody>
+      </p:sp>
+      <p:sp>
+        <p:nvSpPr>
+          <p:cNvPr id="3" name="Content Placeholder 2"/>
+          <p:cNvSpPr>
+            <a:spLocks noGrp="1"/>
+          </p:cNvSpPr>
+          <p:nvPr>
+            <p:ph sz="quarter" idx="1"/>
+          </p:nvPr>
+        </p:nvSpPr>
+        <p:spPr/>
+        <p:txBody>
+          <a:bodyPr>
+            <a:normAutofit lnSpcReduction="10000"/>
+          </a:bodyPr>
+          <a:lstStyle/>
+          <a:p>
+            <a:pPr lvl="0">
+              <a:buNone/>
+              <a:defRPr/>
+            </a:pPr>
+            <a:r>
+              <a:rPr lang="en-US" sz="3200" dirty="0" smtClean="0">
+                <a:latin typeface="Trebuchet MS" pitchFamily="34" charset="0"/>
+              </a:rPr>
+              <a:t> </a:t>
+            </a:r>
+            <a:r>
+              <a:rPr lang="en-US" sz="3200" dirty="0" smtClean="0">
+                <a:latin typeface="Trebuchet MS" pitchFamily="34" charset="0"/>
+              </a:rPr>
+              <a:t>The West has a lot to catch up with to Chinese </a:t>
+            </a:r>
+            <a:r>
+              <a:rPr lang="en-US" sz="3200" dirty="0" err="1" smtClean="0">
+                <a:latin typeface="Trebuchet MS" pitchFamily="34" charset="0"/>
+              </a:rPr>
+              <a:t>superapps</a:t>
+            </a:r>
+            <a:endParaRPr lang="en-US" sz="3200" dirty="0" smtClean="0">
+              <a:solidFill>
+                <a:srgbClr val="00B050"/>
+              </a:solidFill>
+              <a:latin typeface="Trebuchet MS" pitchFamily="34" charset="0"/>
+            </a:endParaRPr>
+          </a:p>
+          <a:p>
+            <a:pPr lvl="0">
+              <a:buNone/>
+              <a:defRPr/>
+            </a:pPr>
+            <a:r>
+              <a:rPr lang="en-US" sz="3200" dirty="0" smtClean="0">
+                <a:latin typeface="Trebuchet MS" pitchFamily="34" charset="0"/>
+              </a:rPr>
+              <a:t> </a:t>
+            </a:r>
+          </a:p>
+          <a:p>
+            <a:pPr lvl="0">
+              <a:buNone/>
+              <a:defRPr/>
+            </a:pPr>
+            <a:r>
+              <a:rPr lang="en-US" sz="3200" dirty="0" smtClean="0">
+                <a:latin typeface="Trebuchet MS" pitchFamily="34" charset="0"/>
+              </a:rPr>
+              <a:t> </a:t>
+            </a:r>
+            <a:r>
+              <a:rPr lang="en-US" sz="3200" dirty="0" smtClean="0">
+                <a:latin typeface="Trebuchet MS" pitchFamily="34" charset="0"/>
+              </a:rPr>
+              <a:t>Why Tetraplex as a </a:t>
+            </a:r>
+            <a:r>
+              <a:rPr lang="en-US" sz="3200" dirty="0" err="1" smtClean="0">
+                <a:latin typeface="Trebuchet MS" pitchFamily="34" charset="0"/>
+              </a:rPr>
+              <a:t>superapp</a:t>
+            </a:r>
+            <a:r>
+              <a:rPr lang="en-US" sz="3200" dirty="0" smtClean="0">
+                <a:latin typeface="Trebuchet MS" pitchFamily="34" charset="0"/>
+              </a:rPr>
+              <a:t> and not X or a Chinese app?</a:t>
+            </a:r>
+          </a:p>
+          <a:p>
+            <a:pPr lvl="0">
+              <a:buNone/>
+              <a:defRPr/>
+            </a:pPr>
+            <a:endParaRPr lang="en-US" sz="3200" dirty="0" smtClean="0">
+              <a:latin typeface="Trebuchet MS" pitchFamily="34" charset="0"/>
+            </a:endParaRPr>
+          </a:p>
+          <a:p>
+            <a:pPr lvl="0">
+              <a:buNone/>
+              <a:defRPr/>
+            </a:pPr>
+            <a:r>
+              <a:rPr lang="en-US" sz="3200" dirty="0" smtClean="0">
+                <a:latin typeface="Trebuchet MS" pitchFamily="34" charset="0"/>
+              </a:rPr>
+              <a:t> </a:t>
+            </a:r>
+            <a:r>
+              <a:rPr lang="en-US" sz="3200" dirty="0" smtClean="0">
+                <a:latin typeface="Trebuchet MS" pitchFamily="34" charset="0"/>
+              </a:rPr>
+              <a:t>  Because we aim to respect your privacy and not collect too much your data since we will be EU based!</a:t>
+            </a:r>
+          </a:p>
+          <a:p>
+            <a:pPr lvl="0">
+              <a:buNone/>
+              <a:defRPr/>
+            </a:pPr>
+            <a:endParaRPr lang="en-US" sz="3200" dirty="0" smtClean="0">
+              <a:latin typeface="Trebuchet MS" pitchFamily="34" charset="0"/>
+            </a:endParaRPr>
+          </a:p>
+          <a:p>
+            <a:pPr lvl="0">
+              <a:buNone/>
+              <a:defRPr/>
+            </a:pPr>
+            <a:r>
+              <a:rPr lang="en-US" sz="3200" dirty="0" smtClean="0">
+                <a:latin typeface="Trebuchet MS" pitchFamily="34" charset="0"/>
+              </a:rPr>
+              <a:t>   X and Chinese apps have negative press, we don’t…   </a:t>
+            </a:r>
+            <a:endParaRPr lang="en-US" dirty="0"/>
+          </a:p>
+        </p:txBody>
+      </p:sp>
+    </p:spTree>
+  </p:cSld>
+  <p:clrMapOvr>
+    <a:masterClrMapping/>
+  </p:clrMapOvr>
+</p:sld>
+</file>
+
+<file path=ppt/slides/slide16.xml><?xml version="1.0" encoding="utf-8"?>
 <p:sld xmlns:a="http://schemas.openxmlformats.org/drawingml/2006/main" xmlns:r="http://schemas.openxmlformats.org/officeDocument/2006/relationships" xmlns:p="http://schemas.openxmlformats.org/presentationml/2006/main">
   <p:cSld>
     <p:spTree>
@@ -5455,7 +5644,7 @@
           <p:cNvPr id="2" name="Titel 1">
             <a:extLst>
               <a:ext uri="{FF2B5EF4-FFF2-40B4-BE49-F238E27FC236}">
-                <a16:creationId xmlns="" xmlns:a16="http://schemas.microsoft.com/office/drawing/2014/main" id="{C21D459F-BF65-98A3-82FE-E681FB41ADC3}"/>
+                <a16:creationId xmlns:a16="http://schemas.microsoft.com/office/drawing/2014/main" xmlns="" id="{C21D459F-BF65-98A3-82FE-E681FB41ADC3}"/>
               </a:ext>
             </a:extLst>
           </p:cNvPr>
@@ -5494,7 +5683,7 @@
           <p:cNvPr id="3" name="Inhaltsplatzhalter 2">
             <a:extLst>
               <a:ext uri="{FF2B5EF4-FFF2-40B4-BE49-F238E27FC236}">
-                <a16:creationId xmlns="" xmlns:a16="http://schemas.microsoft.com/office/drawing/2014/main" id="{75E8FA1C-5EA9-21B0-E50C-8ECC1B166C3E}"/>
+                <a16:creationId xmlns:a16="http://schemas.microsoft.com/office/drawing/2014/main" xmlns="" id="{75E8FA1C-5EA9-21B0-E50C-8ECC1B166C3E}"/>
               </a:ext>
             </a:extLst>
           </p:cNvPr>
@@ -5647,7 +5836,7 @@
     </p:spTree>
     <p:extLst>
       <p:ext uri="{BB962C8B-B14F-4D97-AF65-F5344CB8AC3E}">
-        <p14:creationId xmlns="" xmlns:p14="http://schemas.microsoft.com/office/powerpoint/2010/main" val="3190174708"/>
+        <p14:creationId xmlns:p14="http://schemas.microsoft.com/office/powerpoint/2010/main" xmlns="" val="3190174708"/>
       </p:ext>
     </p:extLst>
   </p:cSld>
@@ -5686,7 +5875,7 @@
           <p:cNvPr id="2" name="Titel 1">
             <a:extLst>
               <a:ext uri="{FF2B5EF4-FFF2-40B4-BE49-F238E27FC236}">
-                <a16:creationId xmlns="" xmlns:a16="http://schemas.microsoft.com/office/drawing/2014/main" id="{C21D459F-BF65-98A3-82FE-E681FB41ADC3}"/>
+                <a16:creationId xmlns:a16="http://schemas.microsoft.com/office/drawing/2014/main" xmlns="" id="{C21D459F-BF65-98A3-82FE-E681FB41ADC3}"/>
               </a:ext>
             </a:extLst>
           </p:cNvPr>
@@ -5864,7 +6053,7 @@
     </p:spTree>
     <p:extLst>
       <p:ext uri="{BB962C8B-B14F-4D97-AF65-F5344CB8AC3E}">
-        <p14:creationId xmlns="" xmlns:p14="http://schemas.microsoft.com/office/powerpoint/2010/main" val="3230060305"/>
+        <p14:creationId xmlns:p14="http://schemas.microsoft.com/office/powerpoint/2010/main" xmlns="" val="3230060305"/>
       </p:ext>
     </p:extLst>
   </p:cSld>
@@ -6132,7 +6321,7 @@
           <p:cNvPr id="2" name="Titel 1">
             <a:extLst>
               <a:ext uri="{FF2B5EF4-FFF2-40B4-BE49-F238E27FC236}">
-                <a16:creationId xmlns="" xmlns:a16="http://schemas.microsoft.com/office/drawing/2014/main" id="{104ADDBE-2857-21DF-31CF-75966D662895}"/>
+                <a16:creationId xmlns:a16="http://schemas.microsoft.com/office/drawing/2014/main" xmlns="" id="{104ADDBE-2857-21DF-31CF-75966D662895}"/>
               </a:ext>
             </a:extLst>
           </p:cNvPr>
@@ -6347,7 +6536,7 @@
     </p:spTree>
     <p:extLst>
       <p:ext uri="{BB962C8B-B14F-4D97-AF65-F5344CB8AC3E}">
-        <p14:creationId xmlns="" xmlns:p14="http://schemas.microsoft.com/office/powerpoint/2010/main" val="3351770822"/>
+        <p14:creationId xmlns:p14="http://schemas.microsoft.com/office/powerpoint/2010/main" xmlns="" val="3351770822"/>
       </p:ext>
     </p:extLst>
   </p:cSld>
@@ -6386,7 +6575,7 @@
           <p:cNvPr id="2" name="Titel 1">
             <a:extLst>
               <a:ext uri="{FF2B5EF4-FFF2-40B4-BE49-F238E27FC236}">
-                <a16:creationId xmlns="" xmlns:a16="http://schemas.microsoft.com/office/drawing/2014/main" id="{D08A566F-4CA9-F7DF-ECEB-910A88862795}"/>
+                <a16:creationId xmlns:a16="http://schemas.microsoft.com/office/drawing/2014/main" xmlns="" id="{D08A566F-4CA9-F7DF-ECEB-910A88862795}"/>
               </a:ext>
             </a:extLst>
           </p:cNvPr>
@@ -6425,7 +6614,7 @@
           <p:cNvPr id="13" name="Inhaltsplatzhalter 2">
             <a:extLst>
               <a:ext uri="{FF2B5EF4-FFF2-40B4-BE49-F238E27FC236}">
-                <a16:creationId xmlns="" xmlns:a16="http://schemas.microsoft.com/office/drawing/2014/main" id="{FAC69121-968E-B939-3377-5335E9638EE8}"/>
+                <a16:creationId xmlns:a16="http://schemas.microsoft.com/office/drawing/2014/main" xmlns="" id="{FAC69121-968E-B939-3377-5335E9638EE8}"/>
               </a:ext>
             </a:extLst>
           </p:cNvPr>
@@ -6548,7 +6737,7 @@
     </p:spTree>
     <p:extLst>
       <p:ext uri="{BB962C8B-B14F-4D97-AF65-F5344CB8AC3E}">
-        <p14:creationId xmlns="" xmlns:p14="http://schemas.microsoft.com/office/powerpoint/2010/main" val="4139908003"/>
+        <p14:creationId xmlns:p14="http://schemas.microsoft.com/office/powerpoint/2010/main" xmlns="" val="4139908003"/>
       </p:ext>
     </p:extLst>
   </p:cSld>
@@ -6830,7 +7019,7 @@
           <p:cNvPr id="2" name="Titel 1">
             <a:extLst>
               <a:ext uri="{FF2B5EF4-FFF2-40B4-BE49-F238E27FC236}">
-                <a16:creationId xmlns="" xmlns:a16="http://schemas.microsoft.com/office/drawing/2014/main" id="{D08A566F-4CA9-F7DF-ECEB-910A88862795}"/>
+                <a16:creationId xmlns:a16="http://schemas.microsoft.com/office/drawing/2014/main" xmlns="" id="{D08A566F-4CA9-F7DF-ECEB-910A88862795}"/>
               </a:ext>
             </a:extLst>
           </p:cNvPr>
@@ -6869,7 +7058,7 @@
           <p:cNvPr id="3" name="Inhaltsplatzhalter 2">
             <a:extLst>
               <a:ext uri="{FF2B5EF4-FFF2-40B4-BE49-F238E27FC236}">
-                <a16:creationId xmlns="" xmlns:a16="http://schemas.microsoft.com/office/drawing/2014/main" id="{FAC69121-968E-B939-3377-5335E9638EE8}"/>
+                <a16:creationId xmlns:a16="http://schemas.microsoft.com/office/drawing/2014/main" xmlns="" id="{FAC69121-968E-B939-3377-5335E9638EE8}"/>
               </a:ext>
             </a:extLst>
           </p:cNvPr>
@@ -6897,7 +7086,7 @@
           <p:cNvPr id="8" name="Inhaltsplatzhalter 2">
             <a:extLst>
               <a:ext uri="{FF2B5EF4-FFF2-40B4-BE49-F238E27FC236}">
-                <a16:creationId xmlns="" xmlns:a16="http://schemas.microsoft.com/office/drawing/2014/main" id="{FAC69121-968E-B939-3377-5335E9638EE8}"/>
+                <a16:creationId xmlns:a16="http://schemas.microsoft.com/office/drawing/2014/main" xmlns="" id="{FAC69121-968E-B939-3377-5335E9638EE8}"/>
               </a:ext>
             </a:extLst>
           </p:cNvPr>
@@ -7148,7 +7337,7 @@
     </p:spTree>
     <p:extLst>
       <p:ext uri="{BB962C8B-B14F-4D97-AF65-F5344CB8AC3E}">
-        <p14:creationId xmlns="" xmlns:p14="http://schemas.microsoft.com/office/powerpoint/2010/main" val="1747655176"/>
+        <p14:creationId xmlns:p14="http://schemas.microsoft.com/office/powerpoint/2010/main" xmlns="" val="1747655176"/>
       </p:ext>
     </p:extLst>
   </p:cSld>
@@ -7187,7 +7376,7 @@
           <p:cNvPr id="2" name="Titel 1">
             <a:extLst>
               <a:ext uri="{FF2B5EF4-FFF2-40B4-BE49-F238E27FC236}">
-                <a16:creationId xmlns="" xmlns:a16="http://schemas.microsoft.com/office/drawing/2014/main" id="{D08A566F-4CA9-F7DF-ECEB-910A88862795}"/>
+                <a16:creationId xmlns:a16="http://schemas.microsoft.com/office/drawing/2014/main" xmlns="" id="{D08A566F-4CA9-F7DF-ECEB-910A88862795}"/>
               </a:ext>
             </a:extLst>
           </p:cNvPr>
@@ -7226,7 +7415,7 @@
           <p:cNvPr id="3" name="Inhaltsplatzhalter 2">
             <a:extLst>
               <a:ext uri="{FF2B5EF4-FFF2-40B4-BE49-F238E27FC236}">
-                <a16:creationId xmlns="" xmlns:a16="http://schemas.microsoft.com/office/drawing/2014/main" id="{FAC69121-968E-B939-3377-5335E9638EE8}"/>
+                <a16:creationId xmlns:a16="http://schemas.microsoft.com/office/drawing/2014/main" xmlns="" id="{FAC69121-968E-B939-3377-5335E9638EE8}"/>
               </a:ext>
             </a:extLst>
           </p:cNvPr>
@@ -7254,7 +7443,7 @@
           <p:cNvPr id="8" name="Inhaltsplatzhalter 2">
             <a:extLst>
               <a:ext uri="{FF2B5EF4-FFF2-40B4-BE49-F238E27FC236}">
-                <a16:creationId xmlns="" xmlns:a16="http://schemas.microsoft.com/office/drawing/2014/main" id="{FAC69121-968E-B939-3377-5335E9638EE8}"/>
+                <a16:creationId xmlns:a16="http://schemas.microsoft.com/office/drawing/2014/main" xmlns="" id="{FAC69121-968E-B939-3377-5335E9638EE8}"/>
               </a:ext>
             </a:extLst>
           </p:cNvPr>
@@ -7682,7 +7871,7 @@
     </p:spTree>
     <p:extLst>
       <p:ext uri="{BB962C8B-B14F-4D97-AF65-F5344CB8AC3E}">
-        <p14:creationId xmlns="" xmlns:p14="http://schemas.microsoft.com/office/powerpoint/2010/main" val="1747655176"/>
+        <p14:creationId xmlns:p14="http://schemas.microsoft.com/office/powerpoint/2010/main" xmlns="" val="1747655176"/>
       </p:ext>
     </p:extLst>
   </p:cSld>

</xml_diff>